<commit_message>
sistema funzionante, modificare dynamic configuration telosb
</commit_message>
<xml_diff>
--- a/presentation.pptx
+++ b/presentation.pptx
@@ -12,8 +12,8 @@
     <p:sldId id="260" r:id="rId6"/>
     <p:sldId id="261" r:id="rId7"/>
     <p:sldId id="266" r:id="rId8"/>
-    <p:sldId id="267" r:id="rId9"/>
-    <p:sldId id="268" r:id="rId10"/>
+    <p:sldId id="268" r:id="rId9"/>
+    <p:sldId id="292" r:id="rId10"/>
     <p:sldId id="269" r:id="rId11"/>
     <p:sldId id="270" r:id="rId12"/>
     <p:sldId id="291" r:id="rId13"/>
@@ -24,22 +24,20 @@
     <p:sldId id="274" r:id="rId18"/>
     <p:sldId id="275" r:id="rId19"/>
     <p:sldId id="276" r:id="rId20"/>
-    <p:sldId id="277" r:id="rId21"/>
-    <p:sldId id="279" r:id="rId22"/>
-    <p:sldId id="280" r:id="rId23"/>
-    <p:sldId id="278" r:id="rId24"/>
-    <p:sldId id="282" r:id="rId25"/>
-    <p:sldId id="283" r:id="rId26"/>
-    <p:sldId id="284" r:id="rId27"/>
-    <p:sldId id="285" r:id="rId28"/>
-    <p:sldId id="287" r:id="rId29"/>
-    <p:sldId id="288" r:id="rId30"/>
-    <p:sldId id="289" r:id="rId31"/>
-    <p:sldId id="286" r:id="rId32"/>
-    <p:sldId id="290" r:id="rId33"/>
-    <p:sldId id="263" r:id="rId34"/>
-    <p:sldId id="264" r:id="rId35"/>
-    <p:sldId id="265" r:id="rId36"/>
+    <p:sldId id="279" r:id="rId21"/>
+    <p:sldId id="280" r:id="rId22"/>
+    <p:sldId id="278" r:id="rId23"/>
+    <p:sldId id="282" r:id="rId24"/>
+    <p:sldId id="283" r:id="rId25"/>
+    <p:sldId id="284" r:id="rId26"/>
+    <p:sldId id="285" r:id="rId27"/>
+    <p:sldId id="287" r:id="rId28"/>
+    <p:sldId id="289" r:id="rId29"/>
+    <p:sldId id="286" r:id="rId30"/>
+    <p:sldId id="290" r:id="rId31"/>
+    <p:sldId id="263" r:id="rId32"/>
+    <p:sldId id="264" r:id="rId33"/>
+    <p:sldId id="265" r:id="rId34"/>
   </p:sldIdLst>
   <p:sldSz cx="12192000" cy="6858000"/>
   <p:notesSz cx="6858000" cy="9144000"/>
@@ -461,7 +459,7 @@
             <a:fld id="{1449AA12-8195-4182-A7AC-2E7E59DFBDAF}" type="datetimeFigureOut">
               <a:rPr lang="en-US" smtClean="0"/>
               <a:pPr algn="r"/>
-              <a:t>1/4/2024</a:t>
+              <a:t>1/7/2024</a:t>
             </a:fld>
             <a:endParaRPr lang="en-US"/>
           </a:p>
@@ -677,7 +675,7 @@
           <a:p>
             <a:fld id="{1449AA12-8195-4182-A7AC-2E7E59DFBDAF}" type="datetimeFigureOut">
               <a:rPr lang="en-US" smtClean="0"/>
-              <a:t>1/4/2024</a:t>
+              <a:t>1/7/2024</a:t>
             </a:fld>
             <a:endParaRPr lang="en-US"/>
           </a:p>
@@ -1049,7 +1047,7 @@
           <a:p>
             <a:fld id="{1449AA12-8195-4182-A7AC-2E7E59DFBDAF}" type="datetimeFigureOut">
               <a:rPr lang="en-US" smtClean="0"/>
-              <a:t>1/4/2024</a:t>
+              <a:t>1/7/2024</a:t>
             </a:fld>
             <a:endParaRPr lang="en-US"/>
           </a:p>
@@ -1411,7 +1409,7 @@
           <a:p>
             <a:fld id="{1449AA12-8195-4182-A7AC-2E7E59DFBDAF}" type="datetimeFigureOut">
               <a:rPr lang="en-US" smtClean="0"/>
-              <a:t>1/4/2024</a:t>
+              <a:t>1/7/2024</a:t>
             </a:fld>
             <a:endParaRPr lang="en-US"/>
           </a:p>
@@ -1851,7 +1849,7 @@
           <a:p>
             <a:fld id="{1449AA12-8195-4182-A7AC-2E7E59DFBDAF}" type="datetimeFigureOut">
               <a:rPr lang="en-US" smtClean="0"/>
-              <a:t>1/4/2024</a:t>
+              <a:t>1/7/2024</a:t>
             </a:fld>
             <a:endParaRPr lang="en-US"/>
           </a:p>
@@ -2291,7 +2289,7 @@
           <a:p>
             <a:fld id="{1449AA12-8195-4182-A7AC-2E7E59DFBDAF}" type="datetimeFigureOut">
               <a:rPr lang="en-US" smtClean="0"/>
-              <a:t>1/4/2024</a:t>
+              <a:t>1/7/2024</a:t>
             </a:fld>
             <a:endParaRPr lang="en-US"/>
           </a:p>
@@ -2899,7 +2897,7 @@
           <a:p>
             <a:fld id="{1449AA12-8195-4182-A7AC-2E7E59DFBDAF}" type="datetimeFigureOut">
               <a:rPr lang="en-US" smtClean="0"/>
-              <a:t>1/4/2024</a:t>
+              <a:t>1/7/2024</a:t>
             </a:fld>
             <a:endParaRPr lang="en-US"/>
           </a:p>
@@ -3204,7 +3202,7 @@
           <a:p>
             <a:fld id="{1449AA12-8195-4182-A7AC-2E7E59DFBDAF}" type="datetimeFigureOut">
               <a:rPr lang="en-US" smtClean="0"/>
-              <a:t>1/4/2024</a:t>
+              <a:t>1/7/2024</a:t>
             </a:fld>
             <a:endParaRPr lang="en-US"/>
           </a:p>
@@ -3481,7 +3479,7 @@
           <a:p>
             <a:fld id="{1449AA12-8195-4182-A7AC-2E7E59DFBDAF}" type="datetimeFigureOut">
               <a:rPr lang="en-US" smtClean="0"/>
-              <a:t>1/4/2024</a:t>
+              <a:t>1/7/2024</a:t>
             </a:fld>
             <a:endParaRPr lang="en-US"/>
           </a:p>
@@ -3958,7 +3956,7 @@
           <a:p>
             <a:fld id="{1449AA12-8195-4182-A7AC-2E7E59DFBDAF}" type="datetimeFigureOut">
               <a:rPr lang="en-US" smtClean="0"/>
-              <a:t>1/4/2024</a:t>
+              <a:t>1/7/2024</a:t>
             </a:fld>
             <a:endParaRPr lang="en-US"/>
           </a:p>
@@ -4413,7 +4411,7 @@
           <a:p>
             <a:fld id="{1449AA12-8195-4182-A7AC-2E7E59DFBDAF}" type="datetimeFigureOut">
               <a:rPr lang="en-US" smtClean="0"/>
-              <a:t>1/4/2024</a:t>
+              <a:t>1/7/2024</a:t>
             </a:fld>
             <a:endParaRPr lang="en-US"/>
           </a:p>
@@ -4824,7 +4822,7 @@
             <a:fld id="{1449AA12-8195-4182-A7AC-2E7E59DFBDAF}" type="datetimeFigureOut">
               <a:rPr lang="en-US" smtClean="0"/>
               <a:pPr/>
-              <a:t>1/4/2024</a:t>
+              <a:t>1/7/2024</a:t>
             </a:fld>
             <a:endParaRPr lang="en-US"/>
           </a:p>
@@ -5931,7 +5929,7 @@
         </p:spPr>
         <p:txBody>
           <a:bodyPr>
-            <a:normAutofit fontScale="77500" lnSpcReduction="20000"/>
+            <a:normAutofit fontScale="92500" lnSpcReduction="20000"/>
           </a:bodyPr>
           <a:lstStyle/>
           <a:p>
@@ -6037,14 +6035,10 @@
             <a:endParaRPr lang="it-IT" dirty="0"/>
           </a:p>
           <a:p>
-            <a:pPr marL="457200" indent="-457200">
-              <a:buFont typeface="+mj-lt"/>
-              <a:buAutoNum type="arabicPeriod"/>
+            <a:pPr marL="0" indent="0">
+              <a:buNone/>
             </a:pPr>
-            <a:r>
-              <a:rPr lang="it-IT" dirty="0"/>
-              <a:t>1-Wire</a:t>
-            </a:r>
+            <a:endParaRPr lang="it-IT" dirty="0"/>
           </a:p>
           <a:p>
             <a:pPr marL="457200" indent="-457200">
@@ -6079,7 +6073,7 @@
         </p:spPr>
         <p:txBody>
           <a:bodyPr>
-            <a:normAutofit fontScale="77500" lnSpcReduction="20000"/>
+            <a:normAutofit fontScale="92500" lnSpcReduction="20000"/>
           </a:bodyPr>
           <a:lstStyle/>
           <a:p>
@@ -6154,28 +6148,6 @@
               <a:rPr lang="it-IT" dirty="0"/>
               <a:t>Docker</a:t>
             </a:r>
-          </a:p>
-          <a:p>
-            <a:pPr marL="457200" indent="-457200">
-              <a:buFont typeface="+mj-lt"/>
-              <a:buAutoNum type="arabicPeriod" startAt="11"/>
-            </a:pPr>
-            <a:r>
-              <a:rPr lang="it-IT" dirty="0" err="1"/>
-              <a:t>DBeaver</a:t>
-            </a:r>
-            <a:endParaRPr lang="it-IT" dirty="0"/>
-          </a:p>
-          <a:p>
-            <a:pPr marL="457200" indent="-457200">
-              <a:buFont typeface="+mj-lt"/>
-              <a:buAutoNum type="arabicPeriod" startAt="11"/>
-            </a:pPr>
-            <a:r>
-              <a:rPr lang="it-IT" dirty="0" err="1"/>
-              <a:t>Postman</a:t>
-            </a:r>
-            <a:endParaRPr lang="it-IT" dirty="0"/>
           </a:p>
           <a:p>
             <a:pPr marL="457200" indent="-457200">
@@ -6918,7 +6890,7 @@
           <p:cNvPr id="2" name="Titolo 1">
             <a:extLst>
               <a:ext uri="{FF2B5EF4-FFF2-40B4-BE49-F238E27FC236}">
-                <a16:creationId xmlns:a16="http://schemas.microsoft.com/office/drawing/2014/main" id="{C17262B5-493B-098E-2823-2E0E7036E571}"/>
+                <a16:creationId xmlns:a16="http://schemas.microsoft.com/office/drawing/2014/main" id="{FE26042A-87B8-3178-A2B3-D52D5C077641}"/>
               </a:ext>
             </a:extLst>
           </p:cNvPr>
@@ -6935,8 +6907,8 @@
           <a:lstStyle/>
           <a:p>
             <a:r>
-              <a:rPr lang="it-IT" dirty="0"/>
-              <a:t>1-Wire</a:t>
+              <a:rPr lang="it-IT" dirty="0" err="1"/>
+              <a:t>AltSoftSerial</a:t>
             </a:r>
             <a:endParaRPr lang="en-US" dirty="0"/>
           </a:p>
@@ -6947,7 +6919,7 @@
           <p:cNvPr id="3" name="Segnaposto contenuto 2">
             <a:extLst>
               <a:ext uri="{FF2B5EF4-FFF2-40B4-BE49-F238E27FC236}">
-                <a16:creationId xmlns:a16="http://schemas.microsoft.com/office/drawing/2014/main" id="{F5488C74-4DE3-00DF-DCED-4EE83BB97CB9}"/>
+                <a16:creationId xmlns:a16="http://schemas.microsoft.com/office/drawing/2014/main" id="{4BD5436A-5827-BA38-0D8D-0F60ADBBB566}"/>
               </a:ext>
             </a:extLst>
           </p:cNvPr>
@@ -6970,7 +6942,7 @@
     </p:spTree>
     <p:extLst>
       <p:ext uri="{BB962C8B-B14F-4D97-AF65-F5344CB8AC3E}">
-        <p14:creationId xmlns:p14="http://schemas.microsoft.com/office/powerpoint/2010/main" val="3435038580"/>
+        <p14:creationId xmlns:p14="http://schemas.microsoft.com/office/powerpoint/2010/main" val="291047632"/>
       </p:ext>
     </p:extLst>
   </p:cSld>
@@ -7002,7 +6974,7 @@
           <p:cNvPr id="2" name="Titolo 1">
             <a:extLst>
               <a:ext uri="{FF2B5EF4-FFF2-40B4-BE49-F238E27FC236}">
-                <a16:creationId xmlns:a16="http://schemas.microsoft.com/office/drawing/2014/main" id="{FE26042A-87B8-3178-A2B3-D52D5C077641}"/>
+                <a16:creationId xmlns:a16="http://schemas.microsoft.com/office/drawing/2014/main" id="{7F89773C-5507-3CAB-2602-B86C96CCE29A}"/>
               </a:ext>
             </a:extLst>
           </p:cNvPr>
@@ -7020,7 +6992,7 @@
           <a:p>
             <a:r>
               <a:rPr lang="it-IT" dirty="0" err="1"/>
-              <a:t>AltSoftSerial</a:t>
+              <a:t>SoftwareSerial</a:t>
             </a:r>
             <a:endParaRPr lang="en-US" dirty="0"/>
           </a:p>
@@ -7031,7 +7003,7 @@
           <p:cNvPr id="3" name="Segnaposto contenuto 2">
             <a:extLst>
               <a:ext uri="{FF2B5EF4-FFF2-40B4-BE49-F238E27FC236}">
-                <a16:creationId xmlns:a16="http://schemas.microsoft.com/office/drawing/2014/main" id="{4BD5436A-5827-BA38-0D8D-0F60ADBBB566}"/>
+                <a16:creationId xmlns:a16="http://schemas.microsoft.com/office/drawing/2014/main" id="{2A5906F7-CE73-18AC-33CE-A8F4F5C34E0D}"/>
               </a:ext>
             </a:extLst>
           </p:cNvPr>
@@ -7054,7 +7026,7 @@
     </p:spTree>
     <p:extLst>
       <p:ext uri="{BB962C8B-B14F-4D97-AF65-F5344CB8AC3E}">
-        <p14:creationId xmlns:p14="http://schemas.microsoft.com/office/powerpoint/2010/main" val="291047632"/>
+        <p14:creationId xmlns:p14="http://schemas.microsoft.com/office/powerpoint/2010/main" val="1408561669"/>
       </p:ext>
     </p:extLst>
   </p:cSld>
@@ -7086,7 +7058,7 @@
           <p:cNvPr id="2" name="Titolo 1">
             <a:extLst>
               <a:ext uri="{FF2B5EF4-FFF2-40B4-BE49-F238E27FC236}">
-                <a16:creationId xmlns:a16="http://schemas.microsoft.com/office/drawing/2014/main" id="{7F89773C-5507-3CAB-2602-B86C96CCE29A}"/>
+                <a16:creationId xmlns:a16="http://schemas.microsoft.com/office/drawing/2014/main" id="{4F22AFAF-AB4A-D04B-0739-98A77D32091D}"/>
               </a:ext>
             </a:extLst>
           </p:cNvPr>
@@ -7103,8 +7075,8 @@
           <a:lstStyle/>
           <a:p>
             <a:r>
-              <a:rPr lang="it-IT" dirty="0" err="1"/>
-              <a:t>SoftwareSerial</a:t>
+              <a:rPr lang="it-IT" dirty="0"/>
+              <a:t>AT-COMMANDS</a:t>
             </a:r>
             <a:endParaRPr lang="en-US" dirty="0"/>
           </a:p>
@@ -7115,7 +7087,7 @@
           <p:cNvPr id="3" name="Segnaposto contenuto 2">
             <a:extLst>
               <a:ext uri="{FF2B5EF4-FFF2-40B4-BE49-F238E27FC236}">
-                <a16:creationId xmlns:a16="http://schemas.microsoft.com/office/drawing/2014/main" id="{2A5906F7-CE73-18AC-33CE-A8F4F5C34E0D}"/>
+                <a16:creationId xmlns:a16="http://schemas.microsoft.com/office/drawing/2014/main" id="{55503F3C-30A2-0755-2341-8F1ED5B985CD}"/>
               </a:ext>
             </a:extLst>
           </p:cNvPr>
@@ -7138,7 +7110,7 @@
     </p:spTree>
     <p:extLst>
       <p:ext uri="{BB962C8B-B14F-4D97-AF65-F5344CB8AC3E}">
-        <p14:creationId xmlns:p14="http://schemas.microsoft.com/office/powerpoint/2010/main" val="1408561669"/>
+        <p14:creationId xmlns:p14="http://schemas.microsoft.com/office/powerpoint/2010/main" val="1906064520"/>
       </p:ext>
     </p:extLst>
   </p:cSld>
@@ -7170,7 +7142,7 @@
           <p:cNvPr id="2" name="Titolo 1">
             <a:extLst>
               <a:ext uri="{FF2B5EF4-FFF2-40B4-BE49-F238E27FC236}">
-                <a16:creationId xmlns:a16="http://schemas.microsoft.com/office/drawing/2014/main" id="{4F22AFAF-AB4A-D04B-0739-98A77D32091D}"/>
+                <a16:creationId xmlns:a16="http://schemas.microsoft.com/office/drawing/2014/main" id="{486821D5-5313-2D7E-437D-2D6D15E77DA1}"/>
               </a:ext>
             </a:extLst>
           </p:cNvPr>
@@ -7187,8 +7159,20 @@
           <a:lstStyle/>
           <a:p>
             <a:r>
+              <a:rPr lang="it-IT" dirty="0" err="1"/>
+              <a:t>JetBrains</a:t>
+            </a:r>
+            <a:r>
               <a:rPr lang="it-IT" dirty="0"/>
-              <a:t>AT-COMMANDS</a:t>
+              <a:t> </a:t>
+            </a:r>
+            <a:r>
+              <a:rPr lang="it-IT" dirty="0" err="1"/>
+              <a:t>IntelliJ</a:t>
+            </a:r>
+            <a:r>
+              <a:rPr lang="it-IT" dirty="0"/>
+              <a:t> IDEA</a:t>
             </a:r>
             <a:endParaRPr lang="en-US" dirty="0"/>
           </a:p>
@@ -7199,7 +7183,7 @@
           <p:cNvPr id="3" name="Segnaposto contenuto 2">
             <a:extLst>
               <a:ext uri="{FF2B5EF4-FFF2-40B4-BE49-F238E27FC236}">
-                <a16:creationId xmlns:a16="http://schemas.microsoft.com/office/drawing/2014/main" id="{55503F3C-30A2-0755-2341-8F1ED5B985CD}"/>
+                <a16:creationId xmlns:a16="http://schemas.microsoft.com/office/drawing/2014/main" id="{09DDDC8A-29AF-6F9C-255A-783327FAEF3A}"/>
               </a:ext>
             </a:extLst>
           </p:cNvPr>
@@ -7222,7 +7206,7 @@
     </p:spTree>
     <p:extLst>
       <p:ext uri="{BB962C8B-B14F-4D97-AF65-F5344CB8AC3E}">
-        <p14:creationId xmlns:p14="http://schemas.microsoft.com/office/powerpoint/2010/main" val="1906064520"/>
+        <p14:creationId xmlns:p14="http://schemas.microsoft.com/office/powerpoint/2010/main" val="3074688665"/>
       </p:ext>
     </p:extLst>
   </p:cSld>
@@ -7254,7 +7238,7 @@
           <p:cNvPr id="2" name="Titolo 1">
             <a:extLst>
               <a:ext uri="{FF2B5EF4-FFF2-40B4-BE49-F238E27FC236}">
-                <a16:creationId xmlns:a16="http://schemas.microsoft.com/office/drawing/2014/main" id="{486821D5-5313-2D7E-437D-2D6D15E77DA1}"/>
+                <a16:creationId xmlns:a16="http://schemas.microsoft.com/office/drawing/2014/main" id="{2586141F-90ED-AD15-107C-9A5F44C10B66}"/>
               </a:ext>
             </a:extLst>
           </p:cNvPr>
@@ -7271,20 +7255,8 @@
           <a:lstStyle/>
           <a:p>
             <a:r>
-              <a:rPr lang="it-IT" dirty="0" err="1"/>
-              <a:t>JetBrains</a:t>
-            </a:r>
-            <a:r>
               <a:rPr lang="it-IT" dirty="0"/>
-              <a:t> </a:t>
-            </a:r>
-            <a:r>
-              <a:rPr lang="it-IT" dirty="0" err="1"/>
-              <a:t>IntelliJ</a:t>
-            </a:r>
-            <a:r>
-              <a:rPr lang="it-IT" dirty="0"/>
-              <a:t> IDEA</a:t>
+              <a:t>Java Programming Language</a:t>
             </a:r>
             <a:endParaRPr lang="en-US" dirty="0"/>
           </a:p>
@@ -7295,7 +7267,7 @@
           <p:cNvPr id="3" name="Segnaposto contenuto 2">
             <a:extLst>
               <a:ext uri="{FF2B5EF4-FFF2-40B4-BE49-F238E27FC236}">
-                <a16:creationId xmlns:a16="http://schemas.microsoft.com/office/drawing/2014/main" id="{09DDDC8A-29AF-6F9C-255A-783327FAEF3A}"/>
+                <a16:creationId xmlns:a16="http://schemas.microsoft.com/office/drawing/2014/main" id="{DAEDB9FB-53A4-21A3-F1BD-2E86B9C66C72}"/>
               </a:ext>
             </a:extLst>
           </p:cNvPr>
@@ -7318,7 +7290,7 @@
     </p:spTree>
     <p:extLst>
       <p:ext uri="{BB962C8B-B14F-4D97-AF65-F5344CB8AC3E}">
-        <p14:creationId xmlns:p14="http://schemas.microsoft.com/office/powerpoint/2010/main" val="3074688665"/>
+        <p14:creationId xmlns:p14="http://schemas.microsoft.com/office/powerpoint/2010/main" val="2043582398"/>
       </p:ext>
     </p:extLst>
   </p:cSld>
@@ -7350,7 +7322,7 @@
           <p:cNvPr id="2" name="Titolo 1">
             <a:extLst>
               <a:ext uri="{FF2B5EF4-FFF2-40B4-BE49-F238E27FC236}">
-                <a16:creationId xmlns:a16="http://schemas.microsoft.com/office/drawing/2014/main" id="{2586141F-90ED-AD15-107C-9A5F44C10B66}"/>
+                <a16:creationId xmlns:a16="http://schemas.microsoft.com/office/drawing/2014/main" id="{000641D5-B18B-512E-DEC4-D471DA78BB89}"/>
               </a:ext>
             </a:extLst>
           </p:cNvPr>
@@ -7367,8 +7339,8 @@
           <a:lstStyle/>
           <a:p>
             <a:r>
-              <a:rPr lang="it-IT" dirty="0"/>
-              <a:t>Java Programming Language</a:t>
+              <a:rPr lang="it-IT" dirty="0" err="1"/>
+              <a:t>BlueCove</a:t>
             </a:r>
             <a:endParaRPr lang="en-US" dirty="0"/>
           </a:p>
@@ -7379,7 +7351,7 @@
           <p:cNvPr id="3" name="Segnaposto contenuto 2">
             <a:extLst>
               <a:ext uri="{FF2B5EF4-FFF2-40B4-BE49-F238E27FC236}">
-                <a16:creationId xmlns:a16="http://schemas.microsoft.com/office/drawing/2014/main" id="{DAEDB9FB-53A4-21A3-F1BD-2E86B9C66C72}"/>
+                <a16:creationId xmlns:a16="http://schemas.microsoft.com/office/drawing/2014/main" id="{5DF35058-34B3-6A9E-9A5D-3405A4A9F5BB}"/>
               </a:ext>
             </a:extLst>
           </p:cNvPr>
@@ -7402,7 +7374,7 @@
     </p:spTree>
     <p:extLst>
       <p:ext uri="{BB962C8B-B14F-4D97-AF65-F5344CB8AC3E}">
-        <p14:creationId xmlns:p14="http://schemas.microsoft.com/office/powerpoint/2010/main" val="2043582398"/>
+        <p14:creationId xmlns:p14="http://schemas.microsoft.com/office/powerpoint/2010/main" val="1856117267"/>
       </p:ext>
     </p:extLst>
   </p:cSld>
@@ -7434,7 +7406,7 @@
           <p:cNvPr id="2" name="Titolo 1">
             <a:extLst>
               <a:ext uri="{FF2B5EF4-FFF2-40B4-BE49-F238E27FC236}">
-                <a16:creationId xmlns:a16="http://schemas.microsoft.com/office/drawing/2014/main" id="{000641D5-B18B-512E-DEC4-D471DA78BB89}"/>
+                <a16:creationId xmlns:a16="http://schemas.microsoft.com/office/drawing/2014/main" id="{7DFB6F0C-0B15-1B07-94E5-967527A520A4}"/>
               </a:ext>
             </a:extLst>
           </p:cNvPr>
@@ -7451,8 +7423,8 @@
           <a:lstStyle/>
           <a:p>
             <a:r>
-              <a:rPr lang="it-IT" dirty="0" err="1"/>
-              <a:t>BlueCove</a:t>
+              <a:rPr lang="it-IT" dirty="0"/>
+              <a:t>Spring Boot</a:t>
             </a:r>
             <a:endParaRPr lang="en-US" dirty="0"/>
           </a:p>
@@ -7463,7 +7435,7 @@
           <p:cNvPr id="3" name="Segnaposto contenuto 2">
             <a:extLst>
               <a:ext uri="{FF2B5EF4-FFF2-40B4-BE49-F238E27FC236}">
-                <a16:creationId xmlns:a16="http://schemas.microsoft.com/office/drawing/2014/main" id="{5DF35058-34B3-6A9E-9A5D-3405A4A9F5BB}"/>
+                <a16:creationId xmlns:a16="http://schemas.microsoft.com/office/drawing/2014/main" id="{70CBD6D0-4670-B492-790C-8CF7A38A1F97}"/>
               </a:ext>
             </a:extLst>
           </p:cNvPr>
@@ -7486,7 +7458,7 @@
     </p:spTree>
     <p:extLst>
       <p:ext uri="{BB962C8B-B14F-4D97-AF65-F5344CB8AC3E}">
-        <p14:creationId xmlns:p14="http://schemas.microsoft.com/office/powerpoint/2010/main" val="1856117267"/>
+        <p14:creationId xmlns:p14="http://schemas.microsoft.com/office/powerpoint/2010/main" val="3909927620"/>
       </p:ext>
     </p:extLst>
   </p:cSld>
@@ -7518,7 +7490,7 @@
           <p:cNvPr id="2" name="Titolo 1">
             <a:extLst>
               <a:ext uri="{FF2B5EF4-FFF2-40B4-BE49-F238E27FC236}">
-                <a16:creationId xmlns:a16="http://schemas.microsoft.com/office/drawing/2014/main" id="{7DFB6F0C-0B15-1B07-94E5-967527A520A4}"/>
+                <a16:creationId xmlns:a16="http://schemas.microsoft.com/office/drawing/2014/main" id="{7E9EC498-DA8E-0B98-D052-04579C88CBD3}"/>
               </a:ext>
             </a:extLst>
           </p:cNvPr>
@@ -7536,7 +7508,7 @@
           <a:p>
             <a:r>
               <a:rPr lang="it-IT" dirty="0"/>
-              <a:t>Spring Boot</a:t>
+              <a:t>Docker</a:t>
             </a:r>
             <a:endParaRPr lang="en-US" dirty="0"/>
           </a:p>
@@ -7547,7 +7519,7 @@
           <p:cNvPr id="3" name="Segnaposto contenuto 2">
             <a:extLst>
               <a:ext uri="{FF2B5EF4-FFF2-40B4-BE49-F238E27FC236}">
-                <a16:creationId xmlns:a16="http://schemas.microsoft.com/office/drawing/2014/main" id="{70CBD6D0-4670-B492-790C-8CF7A38A1F97}"/>
+                <a16:creationId xmlns:a16="http://schemas.microsoft.com/office/drawing/2014/main" id="{565DC275-6840-368F-B04C-0989E5BFF031}"/>
               </a:ext>
             </a:extLst>
           </p:cNvPr>
@@ -7570,7 +7542,7 @@
     </p:spTree>
     <p:extLst>
       <p:ext uri="{BB962C8B-B14F-4D97-AF65-F5344CB8AC3E}">
-        <p14:creationId xmlns:p14="http://schemas.microsoft.com/office/powerpoint/2010/main" val="3909927620"/>
+        <p14:creationId xmlns:p14="http://schemas.microsoft.com/office/powerpoint/2010/main" val="18617395"/>
       </p:ext>
     </p:extLst>
   </p:cSld>
@@ -7602,7 +7574,7 @@
           <p:cNvPr id="2" name="Titolo 1">
             <a:extLst>
               <a:ext uri="{FF2B5EF4-FFF2-40B4-BE49-F238E27FC236}">
-                <a16:creationId xmlns:a16="http://schemas.microsoft.com/office/drawing/2014/main" id="{7E9EC498-DA8E-0B98-D052-04579C88CBD3}"/>
+                <a16:creationId xmlns:a16="http://schemas.microsoft.com/office/drawing/2014/main" id="{E18908FC-5971-EF11-C941-BE26CD40F64B}"/>
               </a:ext>
             </a:extLst>
           </p:cNvPr>
@@ -7619,8 +7591,8 @@
           <a:lstStyle/>
           <a:p>
             <a:r>
-              <a:rPr lang="it-IT" dirty="0"/>
-              <a:t>Docker</a:t>
+              <a:rPr lang="it-IT" dirty="0" err="1"/>
+              <a:t>Postman</a:t>
             </a:r>
             <a:endParaRPr lang="en-US" dirty="0"/>
           </a:p>
@@ -7631,7 +7603,7 @@
           <p:cNvPr id="3" name="Segnaposto contenuto 2">
             <a:extLst>
               <a:ext uri="{FF2B5EF4-FFF2-40B4-BE49-F238E27FC236}">
-                <a16:creationId xmlns:a16="http://schemas.microsoft.com/office/drawing/2014/main" id="{565DC275-6840-368F-B04C-0989E5BFF031}"/>
+                <a16:creationId xmlns:a16="http://schemas.microsoft.com/office/drawing/2014/main" id="{6B8E5F0A-7C82-E869-F45B-9CF264559D92}"/>
               </a:ext>
             </a:extLst>
           </p:cNvPr>
@@ -7654,7 +7626,7 @@
     </p:spTree>
     <p:extLst>
       <p:ext uri="{BB962C8B-B14F-4D97-AF65-F5344CB8AC3E}">
-        <p14:creationId xmlns:p14="http://schemas.microsoft.com/office/powerpoint/2010/main" val="18617395"/>
+        <p14:creationId xmlns:p14="http://schemas.microsoft.com/office/powerpoint/2010/main" val="3590279361"/>
       </p:ext>
     </p:extLst>
   </p:cSld>
@@ -7686,7 +7658,7 @@
           <p:cNvPr id="2" name="Titolo 1">
             <a:extLst>
               <a:ext uri="{FF2B5EF4-FFF2-40B4-BE49-F238E27FC236}">
-                <a16:creationId xmlns:a16="http://schemas.microsoft.com/office/drawing/2014/main" id="{77839FBB-D6D7-C78D-C288-861D7214CDCE}"/>
+                <a16:creationId xmlns:a16="http://schemas.microsoft.com/office/drawing/2014/main" id="{AA0BA2B3-56DA-511D-FB57-AEB2EE527BC1}"/>
               </a:ext>
             </a:extLst>
           </p:cNvPr>
@@ -7703,8 +7675,8 @@
           <a:lstStyle/>
           <a:p>
             <a:r>
-              <a:rPr lang="it-IT" dirty="0" err="1"/>
-              <a:t>DBeaver</a:t>
+              <a:rPr lang="it-IT" dirty="0"/>
+              <a:t>Visual Studio Code</a:t>
             </a:r>
             <a:endParaRPr lang="en-US" dirty="0"/>
           </a:p>
@@ -7715,7 +7687,7 @@
           <p:cNvPr id="3" name="Segnaposto contenuto 2">
             <a:extLst>
               <a:ext uri="{FF2B5EF4-FFF2-40B4-BE49-F238E27FC236}">
-                <a16:creationId xmlns:a16="http://schemas.microsoft.com/office/drawing/2014/main" id="{4DC223E2-6B09-ED60-9B07-74DB43D71B11}"/>
+                <a16:creationId xmlns:a16="http://schemas.microsoft.com/office/drawing/2014/main" id="{3CD54713-0BB6-D4E2-B482-BE6FD3E53AC6}"/>
               </a:ext>
             </a:extLst>
           </p:cNvPr>
@@ -7738,7 +7710,7 @@
     </p:spTree>
     <p:extLst>
       <p:ext uri="{BB962C8B-B14F-4D97-AF65-F5344CB8AC3E}">
-        <p14:creationId xmlns:p14="http://schemas.microsoft.com/office/powerpoint/2010/main" val="109735852"/>
+        <p14:creationId xmlns:p14="http://schemas.microsoft.com/office/powerpoint/2010/main" val="477435110"/>
       </p:ext>
     </p:extLst>
   </p:cSld>
@@ -7856,7 +7828,7 @@
           <p:cNvPr id="2" name="Titolo 1">
             <a:extLst>
               <a:ext uri="{FF2B5EF4-FFF2-40B4-BE49-F238E27FC236}">
-                <a16:creationId xmlns:a16="http://schemas.microsoft.com/office/drawing/2014/main" id="{E18908FC-5971-EF11-C941-BE26CD40F64B}"/>
+                <a16:creationId xmlns:a16="http://schemas.microsoft.com/office/drawing/2014/main" id="{C1F44655-F1B5-F97F-500C-3CC3DFC862CC}"/>
               </a:ext>
             </a:extLst>
           </p:cNvPr>
@@ -7874,7 +7846,7 @@
           <a:p>
             <a:r>
               <a:rPr lang="it-IT" dirty="0" err="1"/>
-              <a:t>Postman</a:t>
+              <a:t>React</a:t>
             </a:r>
             <a:endParaRPr lang="en-US" dirty="0"/>
           </a:p>
@@ -7885,7 +7857,7 @@
           <p:cNvPr id="3" name="Segnaposto contenuto 2">
             <a:extLst>
               <a:ext uri="{FF2B5EF4-FFF2-40B4-BE49-F238E27FC236}">
-                <a16:creationId xmlns:a16="http://schemas.microsoft.com/office/drawing/2014/main" id="{6B8E5F0A-7C82-E869-F45B-9CF264559D92}"/>
+                <a16:creationId xmlns:a16="http://schemas.microsoft.com/office/drawing/2014/main" id="{F4924AEE-410C-B87A-0D3C-96B1EA9E2BD8}"/>
               </a:ext>
             </a:extLst>
           </p:cNvPr>
@@ -7908,7 +7880,7 @@
     </p:spTree>
     <p:extLst>
       <p:ext uri="{BB962C8B-B14F-4D97-AF65-F5344CB8AC3E}">
-        <p14:creationId xmlns:p14="http://schemas.microsoft.com/office/powerpoint/2010/main" val="3590279361"/>
+        <p14:creationId xmlns:p14="http://schemas.microsoft.com/office/powerpoint/2010/main" val="1998483350"/>
       </p:ext>
     </p:extLst>
   </p:cSld>
@@ -7940,7 +7912,7 @@
           <p:cNvPr id="2" name="Titolo 1">
             <a:extLst>
               <a:ext uri="{FF2B5EF4-FFF2-40B4-BE49-F238E27FC236}">
-                <a16:creationId xmlns:a16="http://schemas.microsoft.com/office/drawing/2014/main" id="{AA0BA2B3-56DA-511D-FB57-AEB2EE527BC1}"/>
+                <a16:creationId xmlns:a16="http://schemas.microsoft.com/office/drawing/2014/main" id="{5EB93D20-5E71-4451-5AB8-C64DB255EF11}"/>
               </a:ext>
             </a:extLst>
           </p:cNvPr>
@@ -7957,8 +7929,8 @@
           <a:lstStyle/>
           <a:p>
             <a:r>
-              <a:rPr lang="it-IT" dirty="0"/>
-              <a:t>Visual Studio Code</a:t>
+              <a:rPr lang="it-IT" dirty="0" err="1"/>
+              <a:t>Prototype</a:t>
             </a:r>
             <a:endParaRPr lang="en-US" dirty="0"/>
           </a:p>
@@ -7969,7 +7941,7 @@
           <p:cNvPr id="3" name="Segnaposto contenuto 2">
             <a:extLst>
               <a:ext uri="{FF2B5EF4-FFF2-40B4-BE49-F238E27FC236}">
-                <a16:creationId xmlns:a16="http://schemas.microsoft.com/office/drawing/2014/main" id="{3CD54713-0BB6-D4E2-B482-BE6FD3E53AC6}"/>
+                <a16:creationId xmlns:a16="http://schemas.microsoft.com/office/drawing/2014/main" id="{B48BC5B1-4608-DC0C-30DE-2B8A120497E1}"/>
               </a:ext>
             </a:extLst>
           </p:cNvPr>
@@ -7985,14 +7957,17 @@
           <a:bodyPr/>
           <a:lstStyle/>
           <a:p>
-            <a:endParaRPr lang="en-US"/>
+            <a:pPr marL="0" indent="0">
+              <a:buNone/>
+            </a:pPr>
+            <a:endParaRPr lang="en-US" dirty="0"/>
           </a:p>
         </p:txBody>
       </p:sp>
     </p:spTree>
     <p:extLst>
       <p:ext uri="{BB962C8B-B14F-4D97-AF65-F5344CB8AC3E}">
-        <p14:creationId xmlns:p14="http://schemas.microsoft.com/office/powerpoint/2010/main" val="477435110"/>
+        <p14:creationId xmlns:p14="http://schemas.microsoft.com/office/powerpoint/2010/main" val="2127334610"/>
       </p:ext>
     </p:extLst>
   </p:cSld>
@@ -8024,177 +7999,6 @@
           <p:cNvPr id="2" name="Titolo 1">
             <a:extLst>
               <a:ext uri="{FF2B5EF4-FFF2-40B4-BE49-F238E27FC236}">
-                <a16:creationId xmlns:a16="http://schemas.microsoft.com/office/drawing/2014/main" id="{C1F44655-F1B5-F97F-500C-3CC3DFC862CC}"/>
-              </a:ext>
-            </a:extLst>
-          </p:cNvPr>
-          <p:cNvSpPr>
-            <a:spLocks noGrp="1"/>
-          </p:cNvSpPr>
-          <p:nvPr>
-            <p:ph type="title"/>
-          </p:nvPr>
-        </p:nvSpPr>
-        <p:spPr/>
-        <p:txBody>
-          <a:bodyPr/>
-          <a:lstStyle/>
-          <a:p>
-            <a:r>
-              <a:rPr lang="it-IT" dirty="0" err="1"/>
-              <a:t>React</a:t>
-            </a:r>
-            <a:endParaRPr lang="en-US" dirty="0"/>
-          </a:p>
-        </p:txBody>
-      </p:sp>
-      <p:sp>
-        <p:nvSpPr>
-          <p:cNvPr id="3" name="Segnaposto contenuto 2">
-            <a:extLst>
-              <a:ext uri="{FF2B5EF4-FFF2-40B4-BE49-F238E27FC236}">
-                <a16:creationId xmlns:a16="http://schemas.microsoft.com/office/drawing/2014/main" id="{F4924AEE-410C-B87A-0D3C-96B1EA9E2BD8}"/>
-              </a:ext>
-            </a:extLst>
-          </p:cNvPr>
-          <p:cNvSpPr>
-            <a:spLocks noGrp="1"/>
-          </p:cNvSpPr>
-          <p:nvPr>
-            <p:ph idx="1"/>
-          </p:nvPr>
-        </p:nvSpPr>
-        <p:spPr/>
-        <p:txBody>
-          <a:bodyPr/>
-          <a:lstStyle/>
-          <a:p>
-            <a:endParaRPr lang="en-US"/>
-          </a:p>
-        </p:txBody>
-      </p:sp>
-    </p:spTree>
-    <p:extLst>
-      <p:ext uri="{BB962C8B-B14F-4D97-AF65-F5344CB8AC3E}">
-        <p14:creationId xmlns:p14="http://schemas.microsoft.com/office/powerpoint/2010/main" val="1998483350"/>
-      </p:ext>
-    </p:extLst>
-  </p:cSld>
-  <p:clrMapOvr>
-    <a:masterClrMapping/>
-  </p:clrMapOvr>
-</p:sld>
-</file>
-
-<file path=ppt/slides/slide33.xml><?xml version="1.0" encoding="utf-8"?>
-<p:sld xmlns:a="http://schemas.openxmlformats.org/drawingml/2006/main" xmlns:r="http://schemas.openxmlformats.org/officeDocument/2006/relationships" xmlns:p="http://schemas.openxmlformats.org/presentationml/2006/main">
-  <p:cSld>
-    <p:spTree>
-      <p:nvGrpSpPr>
-        <p:cNvPr id="1" name=""/>
-        <p:cNvGrpSpPr/>
-        <p:nvPr/>
-      </p:nvGrpSpPr>
-      <p:grpSpPr>
-        <a:xfrm>
-          <a:off x="0" y="0"/>
-          <a:ext cx="0" cy="0"/>
-          <a:chOff x="0" y="0"/>
-          <a:chExt cx="0" cy="0"/>
-        </a:xfrm>
-      </p:grpSpPr>
-      <p:sp>
-        <p:nvSpPr>
-          <p:cNvPr id="2" name="Titolo 1">
-            <a:extLst>
-              <a:ext uri="{FF2B5EF4-FFF2-40B4-BE49-F238E27FC236}">
-                <a16:creationId xmlns:a16="http://schemas.microsoft.com/office/drawing/2014/main" id="{5EB93D20-5E71-4451-5AB8-C64DB255EF11}"/>
-              </a:ext>
-            </a:extLst>
-          </p:cNvPr>
-          <p:cNvSpPr>
-            <a:spLocks noGrp="1"/>
-          </p:cNvSpPr>
-          <p:nvPr>
-            <p:ph type="title"/>
-          </p:nvPr>
-        </p:nvSpPr>
-        <p:spPr/>
-        <p:txBody>
-          <a:bodyPr/>
-          <a:lstStyle/>
-          <a:p>
-            <a:r>
-              <a:rPr lang="it-IT" dirty="0" err="1"/>
-              <a:t>Prototype</a:t>
-            </a:r>
-            <a:endParaRPr lang="en-US" dirty="0"/>
-          </a:p>
-        </p:txBody>
-      </p:sp>
-      <p:sp>
-        <p:nvSpPr>
-          <p:cNvPr id="3" name="Segnaposto contenuto 2">
-            <a:extLst>
-              <a:ext uri="{FF2B5EF4-FFF2-40B4-BE49-F238E27FC236}">
-                <a16:creationId xmlns:a16="http://schemas.microsoft.com/office/drawing/2014/main" id="{B48BC5B1-4608-DC0C-30DE-2B8A120497E1}"/>
-              </a:ext>
-            </a:extLst>
-          </p:cNvPr>
-          <p:cNvSpPr>
-            <a:spLocks noGrp="1"/>
-          </p:cNvSpPr>
-          <p:nvPr>
-            <p:ph idx="1"/>
-          </p:nvPr>
-        </p:nvSpPr>
-        <p:spPr/>
-        <p:txBody>
-          <a:bodyPr/>
-          <a:lstStyle/>
-          <a:p>
-            <a:pPr marL="0" indent="0">
-              <a:buNone/>
-            </a:pPr>
-            <a:endParaRPr lang="en-US" dirty="0"/>
-          </a:p>
-        </p:txBody>
-      </p:sp>
-    </p:spTree>
-    <p:extLst>
-      <p:ext uri="{BB962C8B-B14F-4D97-AF65-F5344CB8AC3E}">
-        <p14:creationId xmlns:p14="http://schemas.microsoft.com/office/powerpoint/2010/main" val="2127334610"/>
-      </p:ext>
-    </p:extLst>
-  </p:cSld>
-  <p:clrMapOvr>
-    <a:masterClrMapping/>
-  </p:clrMapOvr>
-</p:sld>
-</file>
-
-<file path=ppt/slides/slide34.xml><?xml version="1.0" encoding="utf-8"?>
-<p:sld xmlns:a="http://schemas.openxmlformats.org/drawingml/2006/main" xmlns:r="http://schemas.openxmlformats.org/officeDocument/2006/relationships" xmlns:p="http://schemas.openxmlformats.org/presentationml/2006/main">
-  <p:cSld>
-    <p:spTree>
-      <p:nvGrpSpPr>
-        <p:cNvPr id="1" name=""/>
-        <p:cNvGrpSpPr/>
-        <p:nvPr/>
-      </p:nvGrpSpPr>
-      <p:grpSpPr>
-        <a:xfrm>
-          <a:off x="0" y="0"/>
-          <a:ext cx="0" cy="0"/>
-          <a:chOff x="0" y="0"/>
-          <a:chExt cx="0" cy="0"/>
-        </a:xfrm>
-      </p:grpSpPr>
-      <p:sp>
-        <p:nvSpPr>
-          <p:cNvPr id="2" name="Titolo 1">
-            <a:extLst>
-              <a:ext uri="{FF2B5EF4-FFF2-40B4-BE49-F238E27FC236}">
                 <a16:creationId xmlns:a16="http://schemas.microsoft.com/office/drawing/2014/main" id="{145C81D0-D0AE-BEB1-E958-68E0CE8413B1}"/>
               </a:ext>
             </a:extLst>
@@ -8264,7 +8068,7 @@
 </p:sld>
 </file>
 
-<file path=ppt/slides/slide35.xml><?xml version="1.0" encoding="utf-8"?>
+<file path=ppt/slides/slide33.xml><?xml version="1.0" encoding="utf-8"?>
 <p:sld xmlns:a="http://schemas.openxmlformats.org/drawingml/2006/main" xmlns:r="http://schemas.openxmlformats.org/officeDocument/2006/relationships" xmlns:p="http://schemas.openxmlformats.org/presentationml/2006/main">
   <p:cSld>
     <p:spTree>
@@ -8657,8 +8461,13 @@
             </a:pPr>
             <a:r>
               <a:rPr lang="it-IT" dirty="0"/>
-              <a:t> DS18B20</a:t>
-            </a:r>
+              <a:t>TDS </a:t>
+            </a:r>
+            <a:r>
+              <a:rPr lang="it-IT" dirty="0" err="1"/>
+              <a:t>QCRobot</a:t>
+            </a:r>
+            <a:endParaRPr lang="it-IT" dirty="0"/>
           </a:p>
           <a:p>
             <a:pPr marL="457200" indent="-457200">
@@ -8667,13 +8476,8 @@
             </a:pPr>
             <a:r>
               <a:rPr lang="it-IT" dirty="0"/>
-              <a:t> TDS </a:t>
-            </a:r>
-            <a:r>
-              <a:rPr lang="it-IT" dirty="0" err="1"/>
-              <a:t>QCRobot</a:t>
-            </a:r>
-            <a:endParaRPr lang="it-IT" dirty="0"/>
+              <a:t>pH E201 4502C</a:t>
+            </a:r>
           </a:p>
           <a:p>
             <a:pPr marL="457200" indent="-457200">
@@ -8817,7 +8621,7 @@
           <p:cNvPr id="2" name="Titolo 1">
             <a:extLst>
               <a:ext uri="{FF2B5EF4-FFF2-40B4-BE49-F238E27FC236}">
-                <a16:creationId xmlns:a16="http://schemas.microsoft.com/office/drawing/2014/main" id="{D044282D-101C-C783-3AC2-DBB33FE7A10C}"/>
+                <a16:creationId xmlns:a16="http://schemas.microsoft.com/office/drawing/2014/main" id="{39A3914B-6CD8-8E5A-C1EA-A4E00C6287BD}"/>
               </a:ext>
             </a:extLst>
           </p:cNvPr>
@@ -8835,7 +8639,11 @@
           <a:p>
             <a:r>
               <a:rPr lang="it-IT" dirty="0"/>
-              <a:t>DS18B20</a:t>
+              <a:t>TDS </a:t>
+            </a:r>
+            <a:r>
+              <a:rPr lang="it-IT" dirty="0" err="1"/>
+              <a:t>QCRobot</a:t>
             </a:r>
             <a:endParaRPr lang="en-US" dirty="0"/>
           </a:p>
@@ -8846,7 +8654,7 @@
           <p:cNvPr id="3" name="Segnaposto contenuto 2">
             <a:extLst>
               <a:ext uri="{FF2B5EF4-FFF2-40B4-BE49-F238E27FC236}">
-                <a16:creationId xmlns:a16="http://schemas.microsoft.com/office/drawing/2014/main" id="{01D837B6-E344-A97B-0BE9-6D9B4489D120}"/>
+                <a16:creationId xmlns:a16="http://schemas.microsoft.com/office/drawing/2014/main" id="{2924556B-7622-1009-FC22-0D7B385E623E}"/>
               </a:ext>
             </a:extLst>
           </p:cNvPr>
@@ -8869,7 +8677,7 @@
     </p:spTree>
     <p:extLst>
       <p:ext uri="{BB962C8B-B14F-4D97-AF65-F5344CB8AC3E}">
-        <p14:creationId xmlns:p14="http://schemas.microsoft.com/office/powerpoint/2010/main" val="1613562549"/>
+        <p14:creationId xmlns:p14="http://schemas.microsoft.com/office/powerpoint/2010/main" val="4239303254"/>
       </p:ext>
     </p:extLst>
   </p:cSld>
@@ -8901,7 +8709,7 @@
           <p:cNvPr id="2" name="Titolo 1">
             <a:extLst>
               <a:ext uri="{FF2B5EF4-FFF2-40B4-BE49-F238E27FC236}">
-                <a16:creationId xmlns:a16="http://schemas.microsoft.com/office/drawing/2014/main" id="{39A3914B-6CD8-8E5A-C1EA-A4E00C6287BD}"/>
+                <a16:creationId xmlns:a16="http://schemas.microsoft.com/office/drawing/2014/main" id="{63E28989-323D-DC5B-99EE-569E6450DEE0}"/>
               </a:ext>
             </a:extLst>
           </p:cNvPr>
@@ -8919,11 +8727,7 @@
           <a:p>
             <a:r>
               <a:rPr lang="it-IT" dirty="0"/>
-              <a:t>TDS </a:t>
-            </a:r>
-            <a:r>
-              <a:rPr lang="it-IT" dirty="0" err="1"/>
-              <a:t>QCRobot</a:t>
+              <a:t>pH E201 4502C</a:t>
             </a:r>
             <a:endParaRPr lang="en-US" dirty="0"/>
           </a:p>
@@ -8934,7 +8738,7 @@
           <p:cNvPr id="3" name="Segnaposto contenuto 2">
             <a:extLst>
               <a:ext uri="{FF2B5EF4-FFF2-40B4-BE49-F238E27FC236}">
-                <a16:creationId xmlns:a16="http://schemas.microsoft.com/office/drawing/2014/main" id="{2924556B-7622-1009-FC22-0D7B385E623E}"/>
+                <a16:creationId xmlns:a16="http://schemas.microsoft.com/office/drawing/2014/main" id="{AFB0CE89-10FC-3D0A-5A66-97640F2E5770}"/>
               </a:ext>
             </a:extLst>
           </p:cNvPr>
@@ -8957,7 +8761,7 @@
     </p:spTree>
     <p:extLst>
       <p:ext uri="{BB962C8B-B14F-4D97-AF65-F5344CB8AC3E}">
-        <p14:creationId xmlns:p14="http://schemas.microsoft.com/office/powerpoint/2010/main" val="4239303254"/>
+        <p14:creationId xmlns:p14="http://schemas.microsoft.com/office/powerpoint/2010/main" val="747990473"/>
       </p:ext>
     </p:extLst>
   </p:cSld>

</xml_diff>